<commit_message>
Added Arduino UNO alternative
</commit_message>
<xml_diff>
--- a/workshop3x/WSNatwork - workshop3.pptx
+++ b/workshop3x/WSNatwork - workshop3.pptx
@@ -5,10 +5,10 @@
     <p:sldMasterId id="2147483648" r:id="rId1"/>
   </p:sldMasterIdLst>
   <p:notesMasterIdLst>
-    <p:notesMasterId r:id="rId15"/>
+    <p:notesMasterId r:id="rId18"/>
   </p:notesMasterIdLst>
   <p:handoutMasterIdLst>
-    <p:handoutMasterId r:id="rId16"/>
+    <p:handoutMasterId r:id="rId19"/>
   </p:handoutMasterIdLst>
   <p:sldIdLst>
     <p:sldId id="285" r:id="rId2"/>
@@ -24,6 +24,9 @@
     <p:sldId id="338" r:id="rId12"/>
     <p:sldId id="339" r:id="rId13"/>
     <p:sldId id="343" r:id="rId14"/>
+    <p:sldId id="344" r:id="rId15"/>
+    <p:sldId id="345" r:id="rId16"/>
+    <p:sldId id="346" r:id="rId17"/>
   </p:sldIdLst>
   <p:sldSz cx="9144000" cy="6858000" type="screen4x3"/>
   <p:notesSz cx="6858000" cy="9144000"/>
@@ -268,7 +271,7 @@
             <a:fld id="{42C944E5-7267-49E9-9024-F89C14269E11}" type="datetimeFigureOut">
               <a:rPr lang="nl-NL" smtClean="0"/>
               <a:pPr/>
-              <a:t>4-2-2016</a:t>
+              <a:t>7-2-2016</a:t>
             </a:fld>
             <a:endParaRPr lang="nl-NL"/>
           </a:p>
@@ -435,7 +438,7 @@
             <a:fld id="{BBBD1AA2-88FB-4D6F-95D1-F27A8A41D388}" type="datetimeFigureOut">
               <a:rPr lang="nl-BE" smtClean="0"/>
               <a:pPr/>
-              <a:t>4/02/2016</a:t>
+              <a:t>7/02/2016</a:t>
             </a:fld>
             <a:endParaRPr lang="nl-BE"/>
           </a:p>
@@ -1130,6 +1133,267 @@
     <p:extLst>
       <p:ext uri="{BB962C8B-B14F-4D97-AF65-F5344CB8AC3E}">
         <p14:creationId xmlns:p14="http://schemas.microsoft.com/office/powerpoint/2010/main" val="200347669"/>
+      </p:ext>
+    </p:extLst>
+  </p:cSld>
+  <p:clrMapOvr>
+    <a:masterClrMapping/>
+  </p:clrMapOvr>
+</p:notes>
+</file>
+
+<file path=ppt/notesSlides/notesSlide14.xml><?xml version="1.0" encoding="utf-8"?>
+<p:notes xmlns:a="http://schemas.openxmlformats.org/drawingml/2006/main" xmlns:r="http://schemas.openxmlformats.org/officeDocument/2006/relationships" xmlns:p="http://schemas.openxmlformats.org/presentationml/2006/main">
+  <p:cSld>
+    <p:spTree>
+      <p:nvGrpSpPr>
+        <p:cNvPr id="1" name=""/>
+        <p:cNvGrpSpPr/>
+        <p:nvPr/>
+      </p:nvGrpSpPr>
+      <p:grpSpPr>
+        <a:xfrm>
+          <a:off x="0" y="0"/>
+          <a:ext cx="0" cy="0"/>
+          <a:chOff x="0" y="0"/>
+          <a:chExt cx="0" cy="0"/>
+        </a:xfrm>
+      </p:grpSpPr>
+      <p:sp>
+        <p:nvSpPr>
+          <p:cNvPr id="2" name="Tijdelijke aanduiding voor dia-afbeelding 1"/>
+          <p:cNvSpPr>
+            <a:spLocks noGrp="1" noRot="1" noChangeAspect="1"/>
+          </p:cNvSpPr>
+          <p:nvPr>
+            <p:ph type="sldImg"/>
+          </p:nvPr>
+        </p:nvSpPr>
+        <p:spPr/>
+      </p:sp>
+      <p:sp>
+        <p:nvSpPr>
+          <p:cNvPr id="3" name="Tijdelijke aanduiding voor notities 2"/>
+          <p:cNvSpPr>
+            <a:spLocks noGrp="1"/>
+          </p:cNvSpPr>
+          <p:nvPr>
+            <p:ph type="body" idx="1"/>
+          </p:nvPr>
+        </p:nvSpPr>
+        <p:spPr/>
+        <p:txBody>
+          <a:bodyPr>
+            <a:normAutofit/>
+          </a:bodyPr>
+          <a:lstStyle/>
+          <a:p>
+            <a:endParaRPr lang="nl-BE" dirty="0"/>
+          </a:p>
+        </p:txBody>
+      </p:sp>
+      <p:sp>
+        <p:nvSpPr>
+          <p:cNvPr id="4" name="Tijdelijke aanduiding voor dianummer 3"/>
+          <p:cNvSpPr>
+            <a:spLocks noGrp="1"/>
+          </p:cNvSpPr>
+          <p:nvPr>
+            <p:ph type="sldNum" sz="quarter" idx="10"/>
+          </p:nvPr>
+        </p:nvSpPr>
+        <p:spPr/>
+        <p:txBody>
+          <a:bodyPr/>
+          <a:lstStyle/>
+          <a:p>
+            <a:fld id="{85439C94-657D-4310-B2E0-6C3DD422A537}" type="slidenum">
+              <a:rPr lang="nl-BE" smtClean="0"/>
+              <a:pPr/>
+              <a:t>14</a:t>
+            </a:fld>
+            <a:endParaRPr lang="nl-BE"/>
+          </a:p>
+        </p:txBody>
+      </p:sp>
+    </p:spTree>
+    <p:extLst>
+      <p:ext uri="{BB962C8B-B14F-4D97-AF65-F5344CB8AC3E}">
+        <p14:creationId xmlns:p14="http://schemas.microsoft.com/office/powerpoint/2010/main" val="285156477"/>
+      </p:ext>
+    </p:extLst>
+  </p:cSld>
+  <p:clrMapOvr>
+    <a:masterClrMapping/>
+  </p:clrMapOvr>
+</p:notes>
+</file>
+
+<file path=ppt/notesSlides/notesSlide15.xml><?xml version="1.0" encoding="utf-8"?>
+<p:notes xmlns:a="http://schemas.openxmlformats.org/drawingml/2006/main" xmlns:r="http://schemas.openxmlformats.org/officeDocument/2006/relationships" xmlns:p="http://schemas.openxmlformats.org/presentationml/2006/main">
+  <p:cSld>
+    <p:spTree>
+      <p:nvGrpSpPr>
+        <p:cNvPr id="1" name=""/>
+        <p:cNvGrpSpPr/>
+        <p:nvPr/>
+      </p:nvGrpSpPr>
+      <p:grpSpPr>
+        <a:xfrm>
+          <a:off x="0" y="0"/>
+          <a:ext cx="0" cy="0"/>
+          <a:chOff x="0" y="0"/>
+          <a:chExt cx="0" cy="0"/>
+        </a:xfrm>
+      </p:grpSpPr>
+      <p:sp>
+        <p:nvSpPr>
+          <p:cNvPr id="2" name="Tijdelijke aanduiding voor dia-afbeelding 1"/>
+          <p:cNvSpPr>
+            <a:spLocks noGrp="1" noRot="1" noChangeAspect="1"/>
+          </p:cNvSpPr>
+          <p:nvPr>
+            <p:ph type="sldImg"/>
+          </p:nvPr>
+        </p:nvSpPr>
+        <p:spPr/>
+      </p:sp>
+      <p:sp>
+        <p:nvSpPr>
+          <p:cNvPr id="3" name="Tijdelijke aanduiding voor notities 2"/>
+          <p:cNvSpPr>
+            <a:spLocks noGrp="1"/>
+          </p:cNvSpPr>
+          <p:nvPr>
+            <p:ph type="body" idx="1"/>
+          </p:nvPr>
+        </p:nvSpPr>
+        <p:spPr/>
+        <p:txBody>
+          <a:bodyPr>
+            <a:normAutofit/>
+          </a:bodyPr>
+          <a:lstStyle/>
+          <a:p>
+            <a:endParaRPr lang="nl-BE" dirty="0"/>
+          </a:p>
+        </p:txBody>
+      </p:sp>
+      <p:sp>
+        <p:nvSpPr>
+          <p:cNvPr id="4" name="Tijdelijke aanduiding voor dianummer 3"/>
+          <p:cNvSpPr>
+            <a:spLocks noGrp="1"/>
+          </p:cNvSpPr>
+          <p:nvPr>
+            <p:ph type="sldNum" sz="quarter" idx="10"/>
+          </p:nvPr>
+        </p:nvSpPr>
+        <p:spPr/>
+        <p:txBody>
+          <a:bodyPr/>
+          <a:lstStyle/>
+          <a:p>
+            <a:fld id="{85439C94-657D-4310-B2E0-6C3DD422A537}" type="slidenum">
+              <a:rPr lang="nl-BE" smtClean="0"/>
+              <a:pPr/>
+              <a:t>15</a:t>
+            </a:fld>
+            <a:endParaRPr lang="nl-BE"/>
+          </a:p>
+        </p:txBody>
+      </p:sp>
+    </p:spTree>
+    <p:extLst>
+      <p:ext uri="{BB962C8B-B14F-4D97-AF65-F5344CB8AC3E}">
+        <p14:creationId xmlns:p14="http://schemas.microsoft.com/office/powerpoint/2010/main" val="1733666856"/>
+      </p:ext>
+    </p:extLst>
+  </p:cSld>
+  <p:clrMapOvr>
+    <a:masterClrMapping/>
+  </p:clrMapOvr>
+</p:notes>
+</file>
+
+<file path=ppt/notesSlides/notesSlide16.xml><?xml version="1.0" encoding="utf-8"?>
+<p:notes xmlns:a="http://schemas.openxmlformats.org/drawingml/2006/main" xmlns:r="http://schemas.openxmlformats.org/officeDocument/2006/relationships" xmlns:p="http://schemas.openxmlformats.org/presentationml/2006/main">
+  <p:cSld>
+    <p:spTree>
+      <p:nvGrpSpPr>
+        <p:cNvPr id="1" name=""/>
+        <p:cNvGrpSpPr/>
+        <p:nvPr/>
+      </p:nvGrpSpPr>
+      <p:grpSpPr>
+        <a:xfrm>
+          <a:off x="0" y="0"/>
+          <a:ext cx="0" cy="0"/>
+          <a:chOff x="0" y="0"/>
+          <a:chExt cx="0" cy="0"/>
+        </a:xfrm>
+      </p:grpSpPr>
+      <p:sp>
+        <p:nvSpPr>
+          <p:cNvPr id="2" name="Tijdelijke aanduiding voor dia-afbeelding 1"/>
+          <p:cNvSpPr>
+            <a:spLocks noGrp="1" noRot="1" noChangeAspect="1"/>
+          </p:cNvSpPr>
+          <p:nvPr>
+            <p:ph type="sldImg"/>
+          </p:nvPr>
+        </p:nvSpPr>
+        <p:spPr/>
+      </p:sp>
+      <p:sp>
+        <p:nvSpPr>
+          <p:cNvPr id="3" name="Tijdelijke aanduiding voor notities 2"/>
+          <p:cNvSpPr>
+            <a:spLocks noGrp="1"/>
+          </p:cNvSpPr>
+          <p:nvPr>
+            <p:ph type="body" idx="1"/>
+          </p:nvPr>
+        </p:nvSpPr>
+        <p:spPr/>
+        <p:txBody>
+          <a:bodyPr>
+            <a:normAutofit/>
+          </a:bodyPr>
+          <a:lstStyle/>
+          <a:p>
+            <a:endParaRPr lang="nl-BE" dirty="0"/>
+          </a:p>
+        </p:txBody>
+      </p:sp>
+      <p:sp>
+        <p:nvSpPr>
+          <p:cNvPr id="4" name="Tijdelijke aanduiding voor dianummer 3"/>
+          <p:cNvSpPr>
+            <a:spLocks noGrp="1"/>
+          </p:cNvSpPr>
+          <p:nvPr>
+            <p:ph type="sldNum" sz="quarter" idx="10"/>
+          </p:nvPr>
+        </p:nvSpPr>
+        <p:spPr/>
+        <p:txBody>
+          <a:bodyPr/>
+          <a:lstStyle/>
+          <a:p>
+            <a:fld id="{85439C94-657D-4310-B2E0-6C3DD422A537}" type="slidenum">
+              <a:rPr lang="nl-BE" smtClean="0"/>
+              <a:pPr/>
+              <a:t>16</a:t>
+            </a:fld>
+            <a:endParaRPr lang="nl-BE"/>
+          </a:p>
+        </p:txBody>
+      </p:sp>
+    </p:spTree>
+    <p:extLst>
+      <p:ext uri="{BB962C8B-B14F-4D97-AF65-F5344CB8AC3E}">
+        <p14:creationId xmlns:p14="http://schemas.microsoft.com/office/powerpoint/2010/main" val="585538716"/>
       </p:ext>
     </p:extLst>
   </p:cSld>
@@ -5254,14 +5518,6 @@
               </a:rPr>
               <a:t> </a:t>
             </a:r>
-            <a:r>
-              <a:rPr lang="es-ES" dirty="0" smtClean="0">
-                <a:solidFill>
-                  <a:schemeClr val="bg1"/>
-                </a:solidFill>
-              </a:rPr>
-              <a:t/>
-            </a:r>
             <a:br>
               <a:rPr lang="es-ES" dirty="0" smtClean="0">
                 <a:solidFill>
@@ -5402,11 +5658,6 @@
               </a:rPr>
               <a:t>NodeMCU</a:t>
             </a:r>
-            <a:endParaRPr lang="nl-BE" sz="4000" dirty="0" smtClean="0">
-              <a:solidFill>
-                <a:schemeClr val="bg1"/>
-              </a:solidFill>
-            </a:endParaRPr>
           </a:p>
         </p:txBody>
       </p:sp>
@@ -5687,11 +5938,6 @@
               </a:rPr>
               <a:t>Full breadboard</a:t>
             </a:r>
-            <a:endParaRPr lang="nl-BE" sz="4000" dirty="0" smtClean="0">
-              <a:solidFill>
-                <a:schemeClr val="bg1"/>
-              </a:solidFill>
-            </a:endParaRPr>
           </a:p>
         </p:txBody>
       </p:sp>
@@ -5967,11 +6213,6 @@
               </a:rPr>
               <a:t>Full breadboard</a:t>
             </a:r>
-            <a:endParaRPr lang="nl-BE" sz="4000" dirty="0" smtClean="0">
-              <a:solidFill>
-                <a:schemeClr val="bg1"/>
-              </a:solidFill>
-            </a:endParaRPr>
           </a:p>
         </p:txBody>
       </p:sp>
@@ -6187,11 +6428,6 @@
               </a:rPr>
               <a:t>Run/Flash switch</a:t>
             </a:r>
-            <a:endParaRPr lang="nl-BE" kern="0" dirty="0" smtClean="0">
-              <a:solidFill>
-                <a:schemeClr val="bg1"/>
-              </a:solidFill>
-            </a:endParaRPr>
           </a:p>
           <a:p>
             <a:r>
@@ -6235,11 +6471,6 @@
               </a:rPr>
               <a:t>External USB-serial </a:t>
             </a:r>
-            <a:endParaRPr lang="nl-BE" kern="0" dirty="0" smtClean="0">
-              <a:solidFill>
-                <a:schemeClr val="bg1"/>
-              </a:solidFill>
-            </a:endParaRPr>
           </a:p>
         </p:txBody>
       </p:sp>
@@ -6304,11 +6535,6 @@
               </a:rPr>
               <a:t>Full breadboard</a:t>
             </a:r>
-            <a:endParaRPr lang="nl-BE" sz="4000" dirty="0" smtClean="0">
-              <a:solidFill>
-                <a:schemeClr val="bg1"/>
-              </a:solidFill>
-            </a:endParaRPr>
           </a:p>
         </p:txBody>
       </p:sp>
@@ -6524,6 +6750,600 @@
               </a:rPr>
               <a:t>USB-serial:</a:t>
             </a:r>
+          </a:p>
+          <a:p>
+            <a:pPr lvl="1"/>
+            <a:r>
+              <a:rPr lang="nl-BE" kern="0" dirty="0" smtClean="0">
+                <a:solidFill>
+                  <a:schemeClr val="bg1"/>
+                </a:solidFill>
+              </a:rPr>
+              <a:t>Power supply:</a:t>
+            </a:r>
+          </a:p>
+          <a:p>
+            <a:pPr lvl="1"/>
+            <a:r>
+              <a:rPr lang="nl-BE" kern="0" dirty="0" smtClean="0">
+                <a:solidFill>
+                  <a:schemeClr val="bg1"/>
+                </a:solidFill>
+              </a:rPr>
+              <a:t>RTC</a:t>
+            </a:r>
+          </a:p>
+          <a:p>
+            <a:pPr lvl="1"/>
+            <a:r>
+              <a:rPr lang="nl-BE" kern="0" dirty="0" smtClean="0">
+                <a:solidFill>
+                  <a:schemeClr val="bg1"/>
+                </a:solidFill>
+              </a:rPr>
+              <a:t>OLED</a:t>
+            </a:r>
+          </a:p>
+          <a:p>
+            <a:pPr lvl="1"/>
+            <a:r>
+              <a:rPr lang="nl-BE" kern="0" dirty="0" smtClean="0">
+                <a:solidFill>
+                  <a:schemeClr val="bg1"/>
+                </a:solidFill>
+              </a:rPr>
+              <a:t>ATSHA204</a:t>
+            </a:r>
+          </a:p>
+        </p:txBody>
+      </p:sp>
+    </p:spTree>
+    <p:extLst>
+      <p:ext uri="{BB962C8B-B14F-4D97-AF65-F5344CB8AC3E}">
+        <p14:creationId xmlns:p14="http://schemas.microsoft.com/office/powerpoint/2010/main" val="3021535333"/>
+      </p:ext>
+    </p:extLst>
+  </p:cSld>
+  <p:clrMapOvr>
+    <a:masterClrMapping/>
+  </p:clrMapOvr>
+  <p:timing>
+    <p:tnLst>
+      <p:par>
+        <p:cTn id="1" dur="indefinite" restart="never" nodeType="tmRoot"/>
+      </p:par>
+    </p:tnLst>
+  </p:timing>
+</p:sld>
+</file>
+
+<file path=ppt/slides/slide14.xml><?xml version="1.0" encoding="utf-8"?>
+<p:sld xmlns:a="http://schemas.openxmlformats.org/drawingml/2006/main" xmlns:r="http://schemas.openxmlformats.org/officeDocument/2006/relationships" xmlns:p="http://schemas.openxmlformats.org/presentationml/2006/main">
+  <p:cSld>
+    <p:spTree>
+      <p:nvGrpSpPr>
+        <p:cNvPr id="1" name=""/>
+        <p:cNvGrpSpPr/>
+        <p:nvPr/>
+      </p:nvGrpSpPr>
+      <p:grpSpPr>
+        <a:xfrm>
+          <a:off x="0" y="0"/>
+          <a:ext cx="0" cy="0"/>
+          <a:chOff x="0" y="0"/>
+          <a:chExt cx="0" cy="0"/>
+        </a:xfrm>
+      </p:grpSpPr>
+      <p:sp>
+        <p:nvSpPr>
+          <p:cNvPr id="5122" name="Title 1"/>
+          <p:cNvSpPr>
+            <a:spLocks noGrp="1"/>
+          </p:cNvSpPr>
+          <p:nvPr>
+            <p:ph type="title"/>
+          </p:nvPr>
+        </p:nvSpPr>
+        <p:spPr/>
+        <p:txBody>
+          <a:bodyPr/>
+          <a:lstStyle/>
+          <a:p>
+            <a:pPr eaLnBrk="1" hangingPunct="1"/>
+            <a:r>
+              <a:rPr lang="nl-BE" sz="4000" dirty="0" smtClean="0">
+                <a:solidFill>
+                  <a:schemeClr val="bg1"/>
+                </a:solidFill>
+              </a:rPr>
+              <a:t>Arduino UNO / Ethernet shield</a:t>
+            </a:r>
+            <a:endParaRPr lang="nl-BE" sz="4000" dirty="0" smtClean="0">
+              <a:solidFill>
+                <a:schemeClr val="bg1"/>
+              </a:solidFill>
+            </a:endParaRPr>
+          </a:p>
+        </p:txBody>
+      </p:sp>
+      <p:sp>
+        <p:nvSpPr>
+          <p:cNvPr id="4" name="Tijdelijke aanduiding voor inhoud 2"/>
+          <p:cNvSpPr txBox="1">
+            <a:spLocks/>
+          </p:cNvSpPr>
+          <p:nvPr/>
+        </p:nvSpPr>
+        <p:spPr bwMode="auto">
+          <a:xfrm>
+            <a:off x="539552" y="1419997"/>
+            <a:ext cx="8229600" cy="4525963"/>
+          </a:xfrm>
+          <a:prstGeom prst="rect">
+            <a:avLst/>
+          </a:prstGeom>
+          <a:noFill/>
+          <a:ln w="9525">
+            <a:noFill/>
+            <a:miter lim="800000"/>
+            <a:headEnd/>
+            <a:tailEnd/>
+          </a:ln>
+          <a:effectLst/>
+        </p:spPr>
+        <p:txBody>
+          <a:bodyPr vert="horz" wrap="square" lIns="91440" tIns="45720" rIns="91440" bIns="45720" numCol="1" anchor="t" anchorCtr="0" compatLnSpc="1">
+            <a:prstTxWarp prst="textNoShape">
+              <a:avLst/>
+            </a:prstTxWarp>
+          </a:bodyPr>
+          <a:lstStyle>
+            <a:lvl1pPr marL="342900" indent="-342900" algn="l" rtl="0" eaLnBrk="0" fontAlgn="base" hangingPunct="0">
+              <a:spcBef>
+                <a:spcPct val="20000"/>
+              </a:spcBef>
+              <a:spcAft>
+                <a:spcPct val="0"/>
+              </a:spcAft>
+              <a:buChar char="•"/>
+              <a:defRPr sz="3200">
+                <a:solidFill>
+                  <a:schemeClr val="tx1"/>
+                </a:solidFill>
+                <a:latin typeface="+mn-lt"/>
+                <a:ea typeface="+mn-ea"/>
+                <a:cs typeface="+mn-cs"/>
+              </a:defRPr>
+            </a:lvl1pPr>
+            <a:lvl2pPr marL="742950" indent="-285750" algn="l" rtl="0" eaLnBrk="0" fontAlgn="base" hangingPunct="0">
+              <a:spcBef>
+                <a:spcPct val="20000"/>
+              </a:spcBef>
+              <a:spcAft>
+                <a:spcPct val="0"/>
+              </a:spcAft>
+              <a:buChar char="–"/>
+              <a:defRPr sz="2800">
+                <a:solidFill>
+                  <a:schemeClr val="tx1"/>
+                </a:solidFill>
+                <a:latin typeface="+mn-lt"/>
+              </a:defRPr>
+            </a:lvl2pPr>
+            <a:lvl3pPr marL="1143000" indent="-228600" algn="l" rtl="0" eaLnBrk="0" fontAlgn="base" hangingPunct="0">
+              <a:spcBef>
+                <a:spcPct val="20000"/>
+              </a:spcBef>
+              <a:spcAft>
+                <a:spcPct val="0"/>
+              </a:spcAft>
+              <a:buChar char="•"/>
+              <a:defRPr sz="2400">
+                <a:solidFill>
+                  <a:schemeClr val="tx1"/>
+                </a:solidFill>
+                <a:latin typeface="+mn-lt"/>
+              </a:defRPr>
+            </a:lvl3pPr>
+            <a:lvl4pPr marL="1600200" indent="-228600" algn="l" rtl="0" eaLnBrk="0" fontAlgn="base" hangingPunct="0">
+              <a:spcBef>
+                <a:spcPct val="20000"/>
+              </a:spcBef>
+              <a:spcAft>
+                <a:spcPct val="0"/>
+              </a:spcAft>
+              <a:buChar char="–"/>
+              <a:defRPr sz="2000">
+                <a:solidFill>
+                  <a:schemeClr val="tx1"/>
+                </a:solidFill>
+                <a:latin typeface="+mn-lt"/>
+              </a:defRPr>
+            </a:lvl4pPr>
+            <a:lvl5pPr marL="2057400" indent="-228600" algn="l" rtl="0" eaLnBrk="0" fontAlgn="base" hangingPunct="0">
+              <a:spcBef>
+                <a:spcPct val="20000"/>
+              </a:spcBef>
+              <a:spcAft>
+                <a:spcPct val="0"/>
+              </a:spcAft>
+              <a:buChar char="»"/>
+              <a:defRPr sz="2000">
+                <a:solidFill>
+                  <a:schemeClr val="tx1"/>
+                </a:solidFill>
+                <a:latin typeface="+mn-lt"/>
+              </a:defRPr>
+            </a:lvl5pPr>
+            <a:lvl6pPr marL="2514600" indent="-228600" algn="l" rtl="0" fontAlgn="base">
+              <a:spcBef>
+                <a:spcPct val="20000"/>
+              </a:spcBef>
+              <a:spcAft>
+                <a:spcPct val="0"/>
+              </a:spcAft>
+              <a:buChar char="»"/>
+              <a:defRPr sz="2000">
+                <a:solidFill>
+                  <a:schemeClr val="tx1"/>
+                </a:solidFill>
+                <a:latin typeface="+mn-lt"/>
+              </a:defRPr>
+            </a:lvl6pPr>
+            <a:lvl7pPr marL="2971800" indent="-228600" algn="l" rtl="0" fontAlgn="base">
+              <a:spcBef>
+                <a:spcPct val="20000"/>
+              </a:spcBef>
+              <a:spcAft>
+                <a:spcPct val="0"/>
+              </a:spcAft>
+              <a:buChar char="»"/>
+              <a:defRPr sz="2000">
+                <a:solidFill>
+                  <a:schemeClr val="tx1"/>
+                </a:solidFill>
+                <a:latin typeface="+mn-lt"/>
+              </a:defRPr>
+            </a:lvl7pPr>
+            <a:lvl8pPr marL="3429000" indent="-228600" algn="l" rtl="0" fontAlgn="base">
+              <a:spcBef>
+                <a:spcPct val="20000"/>
+              </a:spcBef>
+              <a:spcAft>
+                <a:spcPct val="0"/>
+              </a:spcAft>
+              <a:buChar char="»"/>
+              <a:defRPr sz="2000">
+                <a:solidFill>
+                  <a:schemeClr val="tx1"/>
+                </a:solidFill>
+                <a:latin typeface="+mn-lt"/>
+              </a:defRPr>
+            </a:lvl8pPr>
+            <a:lvl9pPr marL="3886200" indent="-228600" algn="l" rtl="0" fontAlgn="base">
+              <a:spcBef>
+                <a:spcPct val="20000"/>
+              </a:spcBef>
+              <a:spcAft>
+                <a:spcPct val="0"/>
+              </a:spcAft>
+              <a:buChar char="»"/>
+              <a:defRPr sz="2000">
+                <a:solidFill>
+                  <a:schemeClr val="tx1"/>
+                </a:solidFill>
+                <a:latin typeface="+mn-lt"/>
+              </a:defRPr>
+            </a:lvl9pPr>
+          </a:lstStyle>
+          <a:p>
+            <a:endParaRPr lang="nl-BE" kern="0" dirty="0" smtClean="0"/>
+          </a:p>
+          <a:p>
+            <a:endParaRPr lang="nl-BE" kern="0" dirty="0" smtClean="0"/>
+          </a:p>
+          <a:p>
+            <a:endParaRPr lang="nl-BE" kern="0" dirty="0"/>
+          </a:p>
+        </p:txBody>
+      </p:sp>
+      <p:pic>
+        <p:nvPicPr>
+          <p:cNvPr id="3" name="Picture 2"/>
+          <p:cNvPicPr>
+            <a:picLocks noChangeAspect="1"/>
+          </p:cNvPicPr>
+          <p:nvPr/>
+        </p:nvPicPr>
+        <p:blipFill>
+          <a:blip r:embed="rId3" cstate="print">
+            <a:extLst>
+              <a:ext uri="{28A0092B-C50C-407E-A947-70E740481C1C}">
+                <a14:useLocalDpi xmlns:a14="http://schemas.microsoft.com/office/drawing/2010/main" val="0"/>
+              </a:ext>
+            </a:extLst>
+          </a:blip>
+          <a:stretch>
+            <a:fillRect/>
+          </a:stretch>
+        </p:blipFill>
+        <p:spPr>
+          <a:xfrm>
+            <a:off x="1763688" y="1431666"/>
+            <a:ext cx="6204181" cy="4653136"/>
+          </a:xfrm>
+          <a:prstGeom prst="rect">
+            <a:avLst/>
+          </a:prstGeom>
+        </p:spPr>
+      </p:pic>
+    </p:spTree>
+    <p:extLst>
+      <p:ext uri="{BB962C8B-B14F-4D97-AF65-F5344CB8AC3E}">
+        <p14:creationId xmlns:p14="http://schemas.microsoft.com/office/powerpoint/2010/main" val="1272952599"/>
+      </p:ext>
+    </p:extLst>
+  </p:cSld>
+  <p:clrMapOvr>
+    <a:masterClrMapping/>
+  </p:clrMapOvr>
+  <p:timing>
+    <p:tnLst>
+      <p:par>
+        <p:cTn id="1" dur="indefinite" restart="never" nodeType="tmRoot"/>
+      </p:par>
+    </p:tnLst>
+  </p:timing>
+</p:sld>
+</file>
+
+<file path=ppt/slides/slide15.xml><?xml version="1.0" encoding="utf-8"?>
+<p:sld xmlns:a="http://schemas.openxmlformats.org/drawingml/2006/main" xmlns:r="http://schemas.openxmlformats.org/officeDocument/2006/relationships" xmlns:p="http://schemas.openxmlformats.org/presentationml/2006/main">
+  <p:cSld>
+    <p:spTree>
+      <p:nvGrpSpPr>
+        <p:cNvPr id="1" name=""/>
+        <p:cNvGrpSpPr/>
+        <p:nvPr/>
+      </p:nvGrpSpPr>
+      <p:grpSpPr>
+        <a:xfrm>
+          <a:off x="0" y="0"/>
+          <a:ext cx="0" cy="0"/>
+          <a:chOff x="0" y="0"/>
+          <a:chExt cx="0" cy="0"/>
+        </a:xfrm>
+      </p:grpSpPr>
+      <p:sp>
+        <p:nvSpPr>
+          <p:cNvPr id="5122" name="Title 1"/>
+          <p:cNvSpPr>
+            <a:spLocks noGrp="1"/>
+          </p:cNvSpPr>
+          <p:nvPr>
+            <p:ph type="title"/>
+          </p:nvPr>
+        </p:nvSpPr>
+        <p:spPr/>
+        <p:txBody>
+          <a:bodyPr/>
+          <a:lstStyle/>
+          <a:p>
+            <a:pPr eaLnBrk="1" hangingPunct="1"/>
+            <a:r>
+              <a:rPr lang="nl-BE" sz="4000" dirty="0" smtClean="0">
+                <a:solidFill>
+                  <a:schemeClr val="bg1"/>
+                </a:solidFill>
+              </a:rPr>
+              <a:t>Arduino UNO / Ethernet shield</a:t>
+            </a:r>
+            <a:endParaRPr lang="nl-BE" sz="4000" dirty="0" smtClean="0">
+              <a:solidFill>
+                <a:schemeClr val="bg1"/>
+              </a:solidFill>
+            </a:endParaRPr>
+          </a:p>
+        </p:txBody>
+      </p:sp>
+      <p:sp>
+        <p:nvSpPr>
+          <p:cNvPr id="4" name="Tijdelijke aanduiding voor inhoud 2"/>
+          <p:cNvSpPr txBox="1">
+            <a:spLocks/>
+          </p:cNvSpPr>
+          <p:nvPr/>
+        </p:nvSpPr>
+        <p:spPr bwMode="auto">
+          <a:xfrm>
+            <a:off x="611560" y="1268760"/>
+            <a:ext cx="8229600" cy="4525963"/>
+          </a:xfrm>
+          <a:prstGeom prst="rect">
+            <a:avLst/>
+          </a:prstGeom>
+          <a:noFill/>
+          <a:ln w="9525">
+            <a:noFill/>
+            <a:miter lim="800000"/>
+            <a:headEnd/>
+            <a:tailEnd/>
+          </a:ln>
+          <a:effectLst/>
+        </p:spPr>
+        <p:txBody>
+          <a:bodyPr vert="horz" wrap="square" lIns="91440" tIns="45720" rIns="91440" bIns="45720" numCol="1" anchor="t" anchorCtr="0" compatLnSpc="1">
+            <a:prstTxWarp prst="textNoShape">
+              <a:avLst/>
+            </a:prstTxWarp>
+          </a:bodyPr>
+          <a:lstStyle>
+            <a:lvl1pPr marL="342900" indent="-342900" algn="l" rtl="0" eaLnBrk="0" fontAlgn="base" hangingPunct="0">
+              <a:spcBef>
+                <a:spcPct val="20000"/>
+              </a:spcBef>
+              <a:spcAft>
+                <a:spcPct val="0"/>
+              </a:spcAft>
+              <a:buChar char="•"/>
+              <a:defRPr sz="3200">
+                <a:solidFill>
+                  <a:schemeClr val="tx1"/>
+                </a:solidFill>
+                <a:latin typeface="+mn-lt"/>
+                <a:ea typeface="+mn-ea"/>
+                <a:cs typeface="+mn-cs"/>
+              </a:defRPr>
+            </a:lvl1pPr>
+            <a:lvl2pPr marL="742950" indent="-285750" algn="l" rtl="0" eaLnBrk="0" fontAlgn="base" hangingPunct="0">
+              <a:spcBef>
+                <a:spcPct val="20000"/>
+              </a:spcBef>
+              <a:spcAft>
+                <a:spcPct val="0"/>
+              </a:spcAft>
+              <a:buChar char="–"/>
+              <a:defRPr sz="2800">
+                <a:solidFill>
+                  <a:schemeClr val="tx1"/>
+                </a:solidFill>
+                <a:latin typeface="+mn-lt"/>
+              </a:defRPr>
+            </a:lvl2pPr>
+            <a:lvl3pPr marL="1143000" indent="-228600" algn="l" rtl="0" eaLnBrk="0" fontAlgn="base" hangingPunct="0">
+              <a:spcBef>
+                <a:spcPct val="20000"/>
+              </a:spcBef>
+              <a:spcAft>
+                <a:spcPct val="0"/>
+              </a:spcAft>
+              <a:buChar char="•"/>
+              <a:defRPr sz="2400">
+                <a:solidFill>
+                  <a:schemeClr val="tx1"/>
+                </a:solidFill>
+                <a:latin typeface="+mn-lt"/>
+              </a:defRPr>
+            </a:lvl3pPr>
+            <a:lvl4pPr marL="1600200" indent="-228600" algn="l" rtl="0" eaLnBrk="0" fontAlgn="base" hangingPunct="0">
+              <a:spcBef>
+                <a:spcPct val="20000"/>
+              </a:spcBef>
+              <a:spcAft>
+                <a:spcPct val="0"/>
+              </a:spcAft>
+              <a:buChar char="–"/>
+              <a:defRPr sz="2000">
+                <a:solidFill>
+                  <a:schemeClr val="tx1"/>
+                </a:solidFill>
+                <a:latin typeface="+mn-lt"/>
+              </a:defRPr>
+            </a:lvl4pPr>
+            <a:lvl5pPr marL="2057400" indent="-228600" algn="l" rtl="0" eaLnBrk="0" fontAlgn="base" hangingPunct="0">
+              <a:spcBef>
+                <a:spcPct val="20000"/>
+              </a:spcBef>
+              <a:spcAft>
+                <a:spcPct val="0"/>
+              </a:spcAft>
+              <a:buChar char="»"/>
+              <a:defRPr sz="2000">
+                <a:solidFill>
+                  <a:schemeClr val="tx1"/>
+                </a:solidFill>
+                <a:latin typeface="+mn-lt"/>
+              </a:defRPr>
+            </a:lvl5pPr>
+            <a:lvl6pPr marL="2514600" indent="-228600" algn="l" rtl="0" fontAlgn="base">
+              <a:spcBef>
+                <a:spcPct val="20000"/>
+              </a:spcBef>
+              <a:spcAft>
+                <a:spcPct val="0"/>
+              </a:spcAft>
+              <a:buChar char="»"/>
+              <a:defRPr sz="2000">
+                <a:solidFill>
+                  <a:schemeClr val="tx1"/>
+                </a:solidFill>
+                <a:latin typeface="+mn-lt"/>
+              </a:defRPr>
+            </a:lvl6pPr>
+            <a:lvl7pPr marL="2971800" indent="-228600" algn="l" rtl="0" fontAlgn="base">
+              <a:spcBef>
+                <a:spcPct val="20000"/>
+              </a:spcBef>
+              <a:spcAft>
+                <a:spcPct val="0"/>
+              </a:spcAft>
+              <a:buChar char="»"/>
+              <a:defRPr sz="2000">
+                <a:solidFill>
+                  <a:schemeClr val="tx1"/>
+                </a:solidFill>
+                <a:latin typeface="+mn-lt"/>
+              </a:defRPr>
+            </a:lvl7pPr>
+            <a:lvl8pPr marL="3429000" indent="-228600" algn="l" rtl="0" fontAlgn="base">
+              <a:spcBef>
+                <a:spcPct val="20000"/>
+              </a:spcBef>
+              <a:spcAft>
+                <a:spcPct val="0"/>
+              </a:spcAft>
+              <a:buChar char="»"/>
+              <a:defRPr sz="2000">
+                <a:solidFill>
+                  <a:schemeClr val="tx1"/>
+                </a:solidFill>
+                <a:latin typeface="+mn-lt"/>
+              </a:defRPr>
+            </a:lvl8pPr>
+            <a:lvl9pPr marL="3886200" indent="-228600" algn="l" rtl="0" fontAlgn="base">
+              <a:spcBef>
+                <a:spcPct val="20000"/>
+              </a:spcBef>
+              <a:spcAft>
+                <a:spcPct val="0"/>
+              </a:spcAft>
+              <a:buChar char="»"/>
+              <a:defRPr sz="2000">
+                <a:solidFill>
+                  <a:schemeClr val="tx1"/>
+                </a:solidFill>
+                <a:latin typeface="+mn-lt"/>
+              </a:defRPr>
+            </a:lvl9pPr>
+          </a:lstStyle>
+          <a:p>
+            <a:r>
+              <a:rPr lang="nl-BE" kern="0" dirty="0" smtClean="0">
+                <a:solidFill>
+                  <a:schemeClr val="bg1"/>
+                </a:solidFill>
+              </a:rPr>
+              <a:t>Pro :</a:t>
+            </a:r>
+          </a:p>
+          <a:p>
+            <a:pPr lvl="1"/>
+            <a:r>
+              <a:rPr lang="nl-BE" kern="0" dirty="0" smtClean="0">
+                <a:solidFill>
+                  <a:schemeClr val="bg1"/>
+                </a:solidFill>
+              </a:rPr>
+              <a:t>Easy to </a:t>
+            </a:r>
+            <a:r>
+              <a:rPr lang="nl-BE" kern="0" dirty="0" smtClean="0">
+                <a:solidFill>
+                  <a:schemeClr val="bg1"/>
+                </a:solidFill>
+              </a:rPr>
+              <a:t>connect  (see also Wemos protoshield)</a:t>
+            </a:r>
             <a:endParaRPr lang="nl-BE" kern="0" dirty="0" smtClean="0">
               <a:solidFill>
                 <a:schemeClr val="bg1"/>
@@ -6538,7 +7358,22 @@
                   <a:schemeClr val="bg1"/>
                 </a:solidFill>
               </a:rPr>
-              <a:t>Power supply:</a:t>
+              <a:t>Plug &amp; play</a:t>
+            </a:r>
+            <a:endParaRPr lang="nl-BE" kern="0" dirty="0" smtClean="0">
+              <a:solidFill>
+                <a:schemeClr val="bg1"/>
+              </a:solidFill>
+            </a:endParaRPr>
+          </a:p>
+          <a:p>
+            <a:r>
+              <a:rPr lang="nl-BE" kern="0" dirty="0" smtClean="0">
+                <a:solidFill>
+                  <a:schemeClr val="bg1"/>
+                </a:solidFill>
+              </a:rPr>
+              <a:t>Con :</a:t>
             </a:r>
           </a:p>
           <a:p>
@@ -6549,7 +7384,7 @@
                   <a:schemeClr val="bg1"/>
                 </a:solidFill>
               </a:rPr>
-              <a:t>RTC</a:t>
+              <a:t>Ethernet connection required</a:t>
             </a:r>
           </a:p>
           <a:p>
@@ -6560,7 +7395,29 @@
                   <a:schemeClr val="bg1"/>
                 </a:solidFill>
               </a:rPr>
-              <a:t>OLED</a:t>
+              <a:t>Limited configuration &amp; extention options</a:t>
+            </a:r>
+          </a:p>
+          <a:p>
+            <a:pPr lvl="2"/>
+            <a:r>
+              <a:rPr lang="nl-BE" kern="0" dirty="0" smtClean="0">
+                <a:solidFill>
+                  <a:schemeClr val="bg1"/>
+                </a:solidFill>
+              </a:rPr>
+              <a:t>Hardcoded settings</a:t>
+            </a:r>
+          </a:p>
+          <a:p>
+            <a:pPr lvl="2"/>
+            <a:r>
+              <a:rPr lang="nl-BE" kern="0" dirty="0" smtClean="0">
+                <a:solidFill>
+                  <a:schemeClr val="bg1"/>
+                </a:solidFill>
+              </a:rPr>
+              <a:t>Memory footprint &gt; 90 % (on nano 96% !!)</a:t>
             </a:r>
           </a:p>
           <a:p>
@@ -6571,15 +7428,350 @@
                   <a:schemeClr val="bg1"/>
                 </a:solidFill>
               </a:rPr>
-              <a:t>ATSHA204</a:t>
-            </a:r>
+              <a:t>Power consumption ethernet shield</a:t>
+            </a:r>
+            <a:endParaRPr lang="nl-BE" kern="0" dirty="0" smtClean="0">
+              <a:solidFill>
+                <a:schemeClr val="bg1"/>
+              </a:solidFill>
+            </a:endParaRPr>
           </a:p>
         </p:txBody>
       </p:sp>
     </p:spTree>
     <p:extLst>
       <p:ext uri="{BB962C8B-B14F-4D97-AF65-F5344CB8AC3E}">
-        <p14:creationId xmlns:p14="http://schemas.microsoft.com/office/powerpoint/2010/main" val="3021535333"/>
+        <p14:creationId xmlns:p14="http://schemas.microsoft.com/office/powerpoint/2010/main" val="2238727548"/>
+      </p:ext>
+    </p:extLst>
+  </p:cSld>
+  <p:clrMapOvr>
+    <a:masterClrMapping/>
+  </p:clrMapOvr>
+  <p:timing>
+    <p:tnLst>
+      <p:par>
+        <p:cTn id="1" dur="indefinite" restart="never" nodeType="tmRoot"/>
+      </p:par>
+    </p:tnLst>
+  </p:timing>
+</p:sld>
+</file>
+
+<file path=ppt/slides/slide16.xml><?xml version="1.0" encoding="utf-8"?>
+<p:sld xmlns:a="http://schemas.openxmlformats.org/drawingml/2006/main" xmlns:r="http://schemas.openxmlformats.org/officeDocument/2006/relationships" xmlns:p="http://schemas.openxmlformats.org/presentationml/2006/main">
+  <p:cSld>
+    <p:spTree>
+      <p:nvGrpSpPr>
+        <p:cNvPr id="1" name=""/>
+        <p:cNvGrpSpPr/>
+        <p:nvPr/>
+      </p:nvGrpSpPr>
+      <p:grpSpPr>
+        <a:xfrm>
+          <a:off x="0" y="0"/>
+          <a:ext cx="0" cy="0"/>
+          <a:chOff x="0" y="0"/>
+          <a:chExt cx="0" cy="0"/>
+        </a:xfrm>
+      </p:grpSpPr>
+      <p:sp>
+        <p:nvSpPr>
+          <p:cNvPr id="5122" name="Title 1"/>
+          <p:cNvSpPr>
+            <a:spLocks noGrp="1"/>
+          </p:cNvSpPr>
+          <p:nvPr>
+            <p:ph type="title"/>
+          </p:nvPr>
+        </p:nvSpPr>
+        <p:spPr/>
+        <p:txBody>
+          <a:bodyPr/>
+          <a:lstStyle/>
+          <a:p>
+            <a:pPr eaLnBrk="1" hangingPunct="1"/>
+            <a:r>
+              <a:rPr lang="nl-BE" sz="4000" dirty="0" smtClean="0">
+                <a:solidFill>
+                  <a:schemeClr val="bg1"/>
+                </a:solidFill>
+              </a:rPr>
+              <a:t>Arduino UNO / Ethernet shield</a:t>
+            </a:r>
+            <a:endParaRPr lang="nl-BE" sz="4000" dirty="0" smtClean="0">
+              <a:solidFill>
+                <a:schemeClr val="bg1"/>
+              </a:solidFill>
+            </a:endParaRPr>
+          </a:p>
+        </p:txBody>
+      </p:sp>
+      <p:sp>
+        <p:nvSpPr>
+          <p:cNvPr id="4" name="Tijdelijke aanduiding voor inhoud 2"/>
+          <p:cNvSpPr txBox="1">
+            <a:spLocks/>
+          </p:cNvSpPr>
+          <p:nvPr/>
+        </p:nvSpPr>
+        <p:spPr bwMode="auto">
+          <a:xfrm>
+            <a:off x="539552" y="1419997"/>
+            <a:ext cx="8229600" cy="4525963"/>
+          </a:xfrm>
+          <a:prstGeom prst="rect">
+            <a:avLst/>
+          </a:prstGeom>
+          <a:noFill/>
+          <a:ln w="9525">
+            <a:noFill/>
+            <a:miter lim="800000"/>
+            <a:headEnd/>
+            <a:tailEnd/>
+          </a:ln>
+          <a:effectLst/>
+        </p:spPr>
+        <p:txBody>
+          <a:bodyPr vert="horz" wrap="square" lIns="91440" tIns="45720" rIns="91440" bIns="45720" numCol="1" anchor="t" anchorCtr="0" compatLnSpc="1">
+            <a:prstTxWarp prst="textNoShape">
+              <a:avLst/>
+            </a:prstTxWarp>
+          </a:bodyPr>
+          <a:lstStyle>
+            <a:lvl1pPr marL="342900" indent="-342900" algn="l" rtl="0" eaLnBrk="0" fontAlgn="base" hangingPunct="0">
+              <a:spcBef>
+                <a:spcPct val="20000"/>
+              </a:spcBef>
+              <a:spcAft>
+                <a:spcPct val="0"/>
+              </a:spcAft>
+              <a:buChar char="•"/>
+              <a:defRPr sz="3200">
+                <a:solidFill>
+                  <a:schemeClr val="tx1"/>
+                </a:solidFill>
+                <a:latin typeface="+mn-lt"/>
+                <a:ea typeface="+mn-ea"/>
+                <a:cs typeface="+mn-cs"/>
+              </a:defRPr>
+            </a:lvl1pPr>
+            <a:lvl2pPr marL="742950" indent="-285750" algn="l" rtl="0" eaLnBrk="0" fontAlgn="base" hangingPunct="0">
+              <a:spcBef>
+                <a:spcPct val="20000"/>
+              </a:spcBef>
+              <a:spcAft>
+                <a:spcPct val="0"/>
+              </a:spcAft>
+              <a:buChar char="–"/>
+              <a:defRPr sz="2800">
+                <a:solidFill>
+                  <a:schemeClr val="tx1"/>
+                </a:solidFill>
+                <a:latin typeface="+mn-lt"/>
+              </a:defRPr>
+            </a:lvl2pPr>
+            <a:lvl3pPr marL="1143000" indent="-228600" algn="l" rtl="0" eaLnBrk="0" fontAlgn="base" hangingPunct="0">
+              <a:spcBef>
+                <a:spcPct val="20000"/>
+              </a:spcBef>
+              <a:spcAft>
+                <a:spcPct val="0"/>
+              </a:spcAft>
+              <a:buChar char="•"/>
+              <a:defRPr sz="2400">
+                <a:solidFill>
+                  <a:schemeClr val="tx1"/>
+                </a:solidFill>
+                <a:latin typeface="+mn-lt"/>
+              </a:defRPr>
+            </a:lvl3pPr>
+            <a:lvl4pPr marL="1600200" indent="-228600" algn="l" rtl="0" eaLnBrk="0" fontAlgn="base" hangingPunct="0">
+              <a:spcBef>
+                <a:spcPct val="20000"/>
+              </a:spcBef>
+              <a:spcAft>
+                <a:spcPct val="0"/>
+              </a:spcAft>
+              <a:buChar char="–"/>
+              <a:defRPr sz="2000">
+                <a:solidFill>
+                  <a:schemeClr val="tx1"/>
+                </a:solidFill>
+                <a:latin typeface="+mn-lt"/>
+              </a:defRPr>
+            </a:lvl4pPr>
+            <a:lvl5pPr marL="2057400" indent="-228600" algn="l" rtl="0" eaLnBrk="0" fontAlgn="base" hangingPunct="0">
+              <a:spcBef>
+                <a:spcPct val="20000"/>
+              </a:spcBef>
+              <a:spcAft>
+                <a:spcPct val="0"/>
+              </a:spcAft>
+              <a:buChar char="»"/>
+              <a:defRPr sz="2000">
+                <a:solidFill>
+                  <a:schemeClr val="tx1"/>
+                </a:solidFill>
+                <a:latin typeface="+mn-lt"/>
+              </a:defRPr>
+            </a:lvl5pPr>
+            <a:lvl6pPr marL="2514600" indent="-228600" algn="l" rtl="0" fontAlgn="base">
+              <a:spcBef>
+                <a:spcPct val="20000"/>
+              </a:spcBef>
+              <a:spcAft>
+                <a:spcPct val="0"/>
+              </a:spcAft>
+              <a:buChar char="»"/>
+              <a:defRPr sz="2000">
+                <a:solidFill>
+                  <a:schemeClr val="tx1"/>
+                </a:solidFill>
+                <a:latin typeface="+mn-lt"/>
+              </a:defRPr>
+            </a:lvl6pPr>
+            <a:lvl7pPr marL="2971800" indent="-228600" algn="l" rtl="0" fontAlgn="base">
+              <a:spcBef>
+                <a:spcPct val="20000"/>
+              </a:spcBef>
+              <a:spcAft>
+                <a:spcPct val="0"/>
+              </a:spcAft>
+              <a:buChar char="»"/>
+              <a:defRPr sz="2000">
+                <a:solidFill>
+                  <a:schemeClr val="tx1"/>
+                </a:solidFill>
+                <a:latin typeface="+mn-lt"/>
+              </a:defRPr>
+            </a:lvl7pPr>
+            <a:lvl8pPr marL="3429000" indent="-228600" algn="l" rtl="0" fontAlgn="base">
+              <a:spcBef>
+                <a:spcPct val="20000"/>
+              </a:spcBef>
+              <a:spcAft>
+                <a:spcPct val="0"/>
+              </a:spcAft>
+              <a:buChar char="»"/>
+              <a:defRPr sz="2000">
+                <a:solidFill>
+                  <a:schemeClr val="tx1"/>
+                </a:solidFill>
+                <a:latin typeface="+mn-lt"/>
+              </a:defRPr>
+            </a:lvl8pPr>
+            <a:lvl9pPr marL="3886200" indent="-228600" algn="l" rtl="0" fontAlgn="base">
+              <a:spcBef>
+                <a:spcPct val="20000"/>
+              </a:spcBef>
+              <a:spcAft>
+                <a:spcPct val="0"/>
+              </a:spcAft>
+              <a:buChar char="»"/>
+              <a:defRPr sz="2000">
+                <a:solidFill>
+                  <a:schemeClr val="tx1"/>
+                </a:solidFill>
+                <a:latin typeface="+mn-lt"/>
+              </a:defRPr>
+            </a:lvl9pPr>
+          </a:lstStyle>
+          <a:p>
+            <a:r>
+              <a:rPr lang="nl-BE" kern="0" dirty="0" smtClean="0">
+                <a:solidFill>
+                  <a:schemeClr val="bg1"/>
+                </a:solidFill>
+              </a:rPr>
+              <a:t>Alie:</a:t>
+            </a:r>
+          </a:p>
+          <a:p>
+            <a:pPr lvl="1"/>
+            <a:r>
+              <a:rPr lang="nl-BE" kern="0" dirty="0">
+                <a:solidFill>
+                  <a:schemeClr val="bg1"/>
+                </a:solidFill>
+              </a:rPr>
+              <a:t> Ethernet : </a:t>
+            </a:r>
+            <a:r>
+              <a:rPr lang="nl-BE" sz="1400" kern="0" dirty="0">
+                <a:solidFill>
+                  <a:schemeClr val="bg1"/>
+                </a:solidFill>
+              </a:rPr>
+              <a:t>http://nl.aliexpress.com/item/</a:t>
+            </a:r>
+            <a:r>
+              <a:rPr lang="nl-BE" sz="1400" kern="0" dirty="0">
+                <a:solidFill>
+                  <a:srgbClr val="FF0000"/>
+                </a:solidFill>
+              </a:rPr>
+              <a:t>W5100-Ethernet-Shield-for-Arduino-Main-Board-UNO-R3-ATMega-328-1280-MEGA2560</a:t>
+            </a:r>
+            <a:r>
+              <a:rPr lang="nl-BE" sz="1400" kern="0" dirty="0">
+                <a:solidFill>
+                  <a:schemeClr val="bg1"/>
+                </a:solidFill>
+              </a:rPr>
+              <a:t>-1Pc/32417441214.html?spm=2114.010208.3.28.npM0nn&amp;ws_ab_test=searchweb201556_9,searchweb201644_4_505_506_503_504_301_502_10014_10001_10002_10016_10017_10010_10005_10011_10006_10003_10004_401_10009_10008,searchweb201560_3,searchweb1451318400_-</a:t>
+            </a:r>
+            <a:r>
+              <a:rPr lang="nl-BE" sz="1400" kern="0" dirty="0" smtClean="0">
+                <a:solidFill>
+                  <a:schemeClr val="bg1"/>
+                </a:solidFill>
+              </a:rPr>
+              <a:t>1,searchweb1451318411_6448&amp;btsid=c4c77b18-21f4-426b-aefa-c9472589e6d0</a:t>
+            </a:r>
+          </a:p>
+          <a:p>
+            <a:pPr lvl="1"/>
+            <a:endParaRPr lang="nl-BE" sz="1400" kern="0" dirty="0">
+              <a:solidFill>
+                <a:schemeClr val="bg1"/>
+              </a:solidFill>
+            </a:endParaRPr>
+          </a:p>
+          <a:p>
+            <a:r>
+              <a:rPr lang="nl-BE" sz="1800" kern="0" dirty="0" smtClean="0">
+                <a:solidFill>
+                  <a:schemeClr val="bg1"/>
+                </a:solidFill>
+              </a:rPr>
+              <a:t>Remark : Ethernet shield 2. (wiznet W5500)</a:t>
+            </a:r>
+          </a:p>
+          <a:p>
+            <a:pPr marL="457200" lvl="1" indent="0">
+              <a:buNone/>
+            </a:pPr>
+            <a:endParaRPr lang="nl-BE" sz="1400" kern="0" dirty="0" smtClean="0">
+              <a:solidFill>
+                <a:schemeClr val="bg1"/>
+              </a:solidFill>
+            </a:endParaRPr>
+          </a:p>
+          <a:p>
+            <a:pPr lvl="1"/>
+            <a:endParaRPr lang="nl-BE" kern="0" dirty="0" smtClean="0">
+              <a:solidFill>
+                <a:schemeClr val="bg1"/>
+              </a:solidFill>
+            </a:endParaRPr>
+          </a:p>
+        </p:txBody>
+      </p:sp>
+    </p:spTree>
+    <p:extLst>
+      <p:ext uri="{BB962C8B-B14F-4D97-AF65-F5344CB8AC3E}">
+        <p14:creationId xmlns:p14="http://schemas.microsoft.com/office/powerpoint/2010/main" val="666053708"/>
       </p:ext>
     </p:extLst>
   </p:cSld>
@@ -6637,11 +7829,6 @@
               </a:rPr>
               <a:t>Wemos &amp; protoshield</a:t>
             </a:r>
-            <a:endParaRPr lang="nl-BE" sz="4000" dirty="0" smtClean="0">
-              <a:solidFill>
-                <a:schemeClr val="bg1"/>
-              </a:solidFill>
-            </a:endParaRPr>
           </a:p>
         </p:txBody>
       </p:sp>
@@ -6917,11 +8104,6 @@
               </a:rPr>
               <a:t>Wemos &amp; protoshield</a:t>
             </a:r>
-            <a:endParaRPr lang="nl-BE" sz="4000" dirty="0" smtClean="0">
-              <a:solidFill>
-                <a:schemeClr val="bg1"/>
-              </a:solidFill>
-            </a:endParaRPr>
           </a:p>
         </p:txBody>
       </p:sp>
@@ -7260,11 +8442,6 @@
               </a:rPr>
               <a:t>Wemos &amp; protoshield</a:t>
             </a:r>
-            <a:endParaRPr lang="nl-BE" sz="4000" dirty="0" smtClean="0">
-              <a:solidFill>
-                <a:schemeClr val="bg1"/>
-              </a:solidFill>
-            </a:endParaRPr>
           </a:p>
         </p:txBody>
       </p:sp>
@@ -7698,11 +8875,6 @@
               </a:rPr>
               <a:t>ESP8266 test board with IO leads</a:t>
             </a:r>
-            <a:endParaRPr lang="nl-BE" sz="4000" dirty="0" smtClean="0">
-              <a:solidFill>
-                <a:schemeClr val="bg1"/>
-              </a:solidFill>
-            </a:endParaRPr>
           </a:p>
         </p:txBody>
       </p:sp>
@@ -7978,11 +9150,6 @@
               </a:rPr>
               <a:t>ESP8266 test board with IO leads</a:t>
             </a:r>
-            <a:endParaRPr lang="nl-BE" sz="4000" dirty="0" smtClean="0">
-              <a:solidFill>
-                <a:schemeClr val="bg1"/>
-              </a:solidFill>
-            </a:endParaRPr>
           </a:p>
         </p:txBody>
       </p:sp>
@@ -8263,11 +9430,6 @@
               </a:rPr>
               <a:t>SOIC breakout for ATSHA204</a:t>
             </a:r>
-            <a:endParaRPr lang="nl-BE" kern="0" dirty="0" smtClean="0">
-              <a:solidFill>
-                <a:schemeClr val="bg1"/>
-              </a:solidFill>
-            </a:endParaRPr>
           </a:p>
           <a:p>
             <a:pPr lvl="1"/>
@@ -8340,11 +9502,6 @@
               </a:rPr>
               <a:t>ESP8266 test board with IO leads</a:t>
             </a:r>
-            <a:endParaRPr lang="nl-BE" sz="4000" dirty="0" smtClean="0">
-              <a:solidFill>
-                <a:schemeClr val="bg1"/>
-              </a:solidFill>
-            </a:endParaRPr>
           </a:p>
         </p:txBody>
       </p:sp>
@@ -8677,11 +9834,6 @@
               </a:rPr>
               <a:t>NodeMCU</a:t>
             </a:r>
-            <a:endParaRPr lang="nl-BE" sz="4000" dirty="0" smtClean="0">
-              <a:solidFill>
-                <a:schemeClr val="bg1"/>
-              </a:solidFill>
-            </a:endParaRPr>
           </a:p>
         </p:txBody>
       </p:sp>
@@ -8957,11 +10109,6 @@
               </a:rPr>
               <a:t>NodeMCU</a:t>
             </a:r>
-            <a:endParaRPr lang="nl-BE" sz="4000" dirty="0" smtClean="0">
-              <a:solidFill>
-                <a:schemeClr val="bg1"/>
-              </a:solidFill>
-            </a:endParaRPr>
           </a:p>
         </p:txBody>
       </p:sp>

</xml_diff>